<commit_message>
PA13-025 Update slides based on Duncan's comments
Change-Id: I375ea3b10a6b054f7a198c23fb2585a9618ac907

Former-commit-id: 285ae939a20497679238f50fee1ae43963ff9763
</commit_message>
<xml_diff>
--- a/slides/EASA_FAA_2016/SPARK_in_Certification.pptx
+++ b/slides/EASA_FAA_2016/SPARK_in_Certification.pptx
@@ -255,7 +255,7 @@
           <a:p>
             <a:fld id="{51FF625C-7176-D94C-95B2-C151D607224F}" type="datetimeFigureOut">
               <a:rPr lang="en-US" smtClean="0"/>
-              <a:t>10/21/16</a:t>
+              <a:t>10/25/16</a:t>
             </a:fld>
             <a:endParaRPr lang="en-US"/>
           </a:p>
@@ -3065,7 +3065,7 @@
           <a:p>
             <a:fld id="{E10C3859-7C27-1F4B-99F8-E55653012AFD}" type="datetimeFigureOut">
               <a:rPr lang="en-US" smtClean="0"/>
-              <a:t>10/21/16</a:t>
+              <a:t>10/25/16</a:t>
             </a:fld>
             <a:endParaRPr lang="en-US"/>
           </a:p>
@@ -3235,7 +3235,7 @@
           <a:p>
             <a:fld id="{E10C3859-7C27-1F4B-99F8-E55653012AFD}" type="datetimeFigureOut">
               <a:rPr lang="en-US" smtClean="0"/>
-              <a:t>10/21/16</a:t>
+              <a:t>10/25/16</a:t>
             </a:fld>
             <a:endParaRPr lang="en-US"/>
           </a:p>
@@ -3415,7 +3415,7 @@
           <a:p>
             <a:fld id="{E10C3859-7C27-1F4B-99F8-E55653012AFD}" type="datetimeFigureOut">
               <a:rPr lang="en-US" smtClean="0"/>
-              <a:t>10/21/16</a:t>
+              <a:t>10/25/16</a:t>
             </a:fld>
             <a:endParaRPr lang="en-US"/>
           </a:p>
@@ -3585,7 +3585,7 @@
           <a:p>
             <a:fld id="{E10C3859-7C27-1F4B-99F8-E55653012AFD}" type="datetimeFigureOut">
               <a:rPr lang="en-US" smtClean="0"/>
-              <a:t>10/21/16</a:t>
+              <a:t>10/25/16</a:t>
             </a:fld>
             <a:endParaRPr lang="en-US"/>
           </a:p>
@@ -3831,7 +3831,7 @@
           <a:p>
             <a:fld id="{E10C3859-7C27-1F4B-99F8-E55653012AFD}" type="datetimeFigureOut">
               <a:rPr lang="en-US" smtClean="0"/>
-              <a:t>10/21/16</a:t>
+              <a:t>10/25/16</a:t>
             </a:fld>
             <a:endParaRPr lang="en-US"/>
           </a:p>
@@ -4063,7 +4063,7 @@
           <a:p>
             <a:fld id="{E10C3859-7C27-1F4B-99F8-E55653012AFD}" type="datetimeFigureOut">
               <a:rPr lang="en-US" smtClean="0"/>
-              <a:t>10/21/16</a:t>
+              <a:t>10/25/16</a:t>
             </a:fld>
             <a:endParaRPr lang="en-US"/>
           </a:p>
@@ -4430,7 +4430,7 @@
           <a:p>
             <a:fld id="{E10C3859-7C27-1F4B-99F8-E55653012AFD}" type="datetimeFigureOut">
               <a:rPr lang="en-US" smtClean="0"/>
-              <a:t>10/21/16</a:t>
+              <a:t>10/25/16</a:t>
             </a:fld>
             <a:endParaRPr lang="en-US"/>
           </a:p>
@@ -4548,7 +4548,7 @@
           <a:p>
             <a:fld id="{E10C3859-7C27-1F4B-99F8-E55653012AFD}" type="datetimeFigureOut">
               <a:rPr lang="en-US" smtClean="0"/>
-              <a:t>10/21/16</a:t>
+              <a:t>10/25/16</a:t>
             </a:fld>
             <a:endParaRPr lang="en-US"/>
           </a:p>
@@ -4643,7 +4643,7 @@
           <a:p>
             <a:fld id="{E10C3859-7C27-1F4B-99F8-E55653012AFD}" type="datetimeFigureOut">
               <a:rPr lang="en-US" smtClean="0"/>
-              <a:t>10/21/16</a:t>
+              <a:t>10/25/16</a:t>
             </a:fld>
             <a:endParaRPr lang="en-US"/>
           </a:p>
@@ -4920,7 +4920,7 @@
           <a:p>
             <a:fld id="{E10C3859-7C27-1F4B-99F8-E55653012AFD}" type="datetimeFigureOut">
               <a:rPr lang="en-US" smtClean="0"/>
-              <a:t>10/21/16</a:t>
+              <a:t>10/25/16</a:t>
             </a:fld>
             <a:endParaRPr lang="en-US"/>
           </a:p>
@@ -5173,7 +5173,7 @@
           <a:p>
             <a:fld id="{E10C3859-7C27-1F4B-99F8-E55653012AFD}" type="datetimeFigureOut">
               <a:rPr lang="en-US" smtClean="0"/>
-              <a:t>10/21/16</a:t>
+              <a:t>10/25/16</a:t>
             </a:fld>
             <a:endParaRPr lang="en-US"/>
           </a:p>
@@ -5386,7 +5386,7 @@
           <a:p>
             <a:fld id="{E10C3859-7C27-1F4B-99F8-E55653012AFD}" type="datetimeFigureOut">
               <a:rPr lang="en-US" smtClean="0"/>
-              <a:t>10/21/16</a:t>
+              <a:t>10/25/16</a:t>
             </a:fld>
             <a:endParaRPr lang="en-US"/>
           </a:p>
@@ -10440,7 +10440,11 @@
           <a:p>
             <a:r>
               <a:rPr lang="en-US" dirty="0" smtClean="0"/>
-              <a:t>Formals Methods Landscape</a:t>
+              <a:t>Formal </a:t>
+            </a:r>
+            <a:r>
+              <a:rPr lang="en-US" dirty="0" smtClean="0"/>
+              <a:t>Methods Landscape</a:t>
             </a:r>
             <a:endParaRPr lang="en-US" dirty="0"/>
           </a:p>
@@ -12943,7 +12947,11 @@
           <a:p>
             <a:r>
               <a:rPr lang="en-US" dirty="0" smtClean="0"/>
-              <a:t>Formals Methods Landscape</a:t>
+              <a:t>Formal </a:t>
+            </a:r>
+            <a:r>
+              <a:rPr lang="en-US" dirty="0" smtClean="0"/>
+              <a:t>Methods Landscape</a:t>
             </a:r>
             <a:endParaRPr lang="en-US" dirty="0"/>
           </a:p>
@@ -16212,7 +16220,7 @@
         <p:spPr/>
         <p:txBody>
           <a:bodyPr>
-            <a:normAutofit lnSpcReduction="10000"/>
+            <a:normAutofit/>
           </a:bodyPr>
           <a:lstStyle/>
           <a:p>
@@ -16282,7 +16290,11 @@
             </a:pPr>
             <a:r>
               <a:rPr lang="en-US" dirty="0" smtClean="0"/>
-              <a:t>Three kinds of extraneous code:</a:t>
+              <a:t>Two kinds </a:t>
+            </a:r>
+            <a:r>
+              <a:rPr lang="en-US" dirty="0" smtClean="0"/>
+              <a:t>of extraneous code:</a:t>
             </a:r>
           </a:p>
           <a:p>
@@ -16297,20 +16309,12 @@
               <a:buAutoNum type="arabicPeriod"/>
             </a:pPr>
             <a:r>
-              <a:rPr lang="en-US" dirty="0"/>
+              <a:rPr lang="en-US" dirty="0" smtClean="0"/>
               <a:t>“</a:t>
             </a:r>
             <a:r>
               <a:rPr lang="en-US" dirty="0" smtClean="0"/>
-              <a:t>deactivated </a:t>
-            </a:r>
-            <a:r>
-              <a:rPr lang="en-US" dirty="0"/>
-              <a:t>code” is </a:t>
-            </a:r>
-            <a:r>
-              <a:rPr lang="en-US" dirty="0" smtClean="0"/>
-              <a:t>unreachable in current configuration</a:t>
+              <a:t>dead code” is present by error and unreachable</a:t>
             </a:r>
           </a:p>
           <a:p>
@@ -16326,7 +16330,7 @@
             </a:pPr>
             <a:r>
               <a:rPr lang="en-US" dirty="0" smtClean="0"/>
-              <a:t>“dead code” is present by error and unreachable</a:t>
+              <a:t>“unintended functionality” can be executed</a:t>
             </a:r>
           </a:p>
           <a:p>
@@ -16340,22 +16344,6 @@
               <a:buFont typeface="+mj-lt"/>
               <a:buAutoNum type="arabicPeriod"/>
             </a:pPr>
-            <a:r>
-              <a:rPr lang="en-US" dirty="0" smtClean="0"/>
-              <a:t>“unintended functionality” can be executed</a:t>
-            </a:r>
-          </a:p>
-          <a:p>
-            <a:pPr marL="971550" lvl="1" indent="-514350">
-              <a:lnSpc>
-                <a:spcPct val="100000"/>
-              </a:lnSpc>
-              <a:spcBef>
-                <a:spcPts val="0"/>
-              </a:spcBef>
-              <a:buFont typeface="+mj-lt"/>
-              <a:buAutoNum type="arabicPeriod"/>
-            </a:pPr>
             <a:endParaRPr lang="en-US" dirty="0"/>
           </a:p>
           <a:p>
@@ -16370,8 +16358,13 @@
             </a:pPr>
             <a:r>
               <a:rPr lang="en-US" dirty="0" smtClean="0"/>
-              <a:t>No problems with (1) and (2)</a:t>
-            </a:r>
+              <a:t>No problems with (1</a:t>
+            </a:r>
+            <a:r>
+              <a:rPr lang="en-US" dirty="0" smtClean="0"/>
+              <a:t>)</a:t>
+            </a:r>
+            <a:endParaRPr lang="en-US" dirty="0" smtClean="0"/>
           </a:p>
           <a:p>
             <a:pPr marL="0" indent="0">
@@ -16397,7 +16390,15 @@
             </a:pPr>
             <a:r>
               <a:rPr lang="en-US" dirty="0" smtClean="0"/>
-              <a:t>For (3) review can complete </a:t>
+              <a:t>For </a:t>
+            </a:r>
+            <a:r>
+              <a:rPr lang="en-US" dirty="0" smtClean="0"/>
+              <a:t>(2) </a:t>
+            </a:r>
+            <a:r>
+              <a:rPr lang="en-US" dirty="0" smtClean="0"/>
+              <a:t>review can complete </a:t>
             </a:r>
             <a:r>
               <a:rPr lang="en-US" dirty="0"/>
@@ -21442,7 +21443,6 @@
               <a:rPr lang="en-US" sz="3200" dirty="0" smtClean="0"/>
               <a:t>1997</a:t>
             </a:r>
-            <a:endParaRPr lang="en-US" sz="3200" dirty="0" smtClean="0"/>
           </a:p>
           <a:p>
             <a:pPr algn="ctr"/>

</xml_diff>